<commit_message>
[MOD] update new page for the best practice of xiecheng involved with MQ
</commit_message>
<xml_diff>
--- a/doc/ActiveMQ.pptx
+++ b/doc/ActiveMQ.pptx
@@ -46,6 +46,7 @@
     <p:sldId id="293" r:id="rId40"/>
     <p:sldId id="294" r:id="rId41"/>
     <p:sldId id="287" r:id="rId42"/>
+    <p:sldId id="303" r:id="rId43"/>
   </p:sldIdLst>
   <p:sldSz cx="9144000" cy="6858000" type="screen4x3"/>
   <p:notesSz cx="6858000" cy="9144000"/>
@@ -345,7 +346,7 @@
             <a:fld id="{530820CF-B880-4189-942D-D702A7CBA730}" type="datetimeFigureOut">
               <a:rPr lang="zh-CN" altLang="en-US" smtClean="0"/>
               <a:pPr/>
-              <a:t>2015/9/11</a:t>
+              <a:t>2015/12/17</a:t>
             </a:fld>
             <a:endParaRPr lang="zh-CN" altLang="en-US"/>
           </a:p>
@@ -512,7 +513,7 @@
             <a:fld id="{530820CF-B880-4189-942D-D702A7CBA730}" type="datetimeFigureOut">
               <a:rPr lang="zh-CN" altLang="en-US" smtClean="0"/>
               <a:pPr/>
-              <a:t>2015/9/11</a:t>
+              <a:t>2015/12/17</a:t>
             </a:fld>
             <a:endParaRPr lang="zh-CN" altLang="en-US"/>
           </a:p>
@@ -689,7 +690,7 @@
             <a:fld id="{530820CF-B880-4189-942D-D702A7CBA730}" type="datetimeFigureOut">
               <a:rPr lang="zh-CN" altLang="en-US" smtClean="0"/>
               <a:pPr/>
-              <a:t>2015/9/11</a:t>
+              <a:t>2015/12/17</a:t>
             </a:fld>
             <a:endParaRPr lang="zh-CN" altLang="en-US"/>
           </a:p>
@@ -856,7 +857,7 @@
             <a:fld id="{530820CF-B880-4189-942D-D702A7CBA730}" type="datetimeFigureOut">
               <a:rPr lang="zh-CN" altLang="en-US" smtClean="0"/>
               <a:pPr/>
-              <a:t>2015/9/11</a:t>
+              <a:t>2015/12/17</a:t>
             </a:fld>
             <a:endParaRPr lang="zh-CN" altLang="en-US"/>
           </a:p>
@@ -1099,7 +1100,7 @@
             <a:fld id="{530820CF-B880-4189-942D-D702A7CBA730}" type="datetimeFigureOut">
               <a:rPr lang="zh-CN" altLang="en-US" smtClean="0"/>
               <a:pPr/>
-              <a:t>2015/9/11</a:t>
+              <a:t>2015/12/17</a:t>
             </a:fld>
             <a:endParaRPr lang="zh-CN" altLang="en-US"/>
           </a:p>
@@ -1384,7 +1385,7 @@
             <a:fld id="{530820CF-B880-4189-942D-D702A7CBA730}" type="datetimeFigureOut">
               <a:rPr lang="zh-CN" altLang="en-US" smtClean="0"/>
               <a:pPr/>
-              <a:t>2015/9/11</a:t>
+              <a:t>2015/12/17</a:t>
             </a:fld>
             <a:endParaRPr lang="zh-CN" altLang="en-US"/>
           </a:p>
@@ -1803,7 +1804,7 @@
             <a:fld id="{530820CF-B880-4189-942D-D702A7CBA730}" type="datetimeFigureOut">
               <a:rPr lang="zh-CN" altLang="en-US" smtClean="0"/>
               <a:pPr/>
-              <a:t>2015/9/11</a:t>
+              <a:t>2015/12/17</a:t>
             </a:fld>
             <a:endParaRPr lang="zh-CN" altLang="en-US"/>
           </a:p>
@@ -1918,7 +1919,7 @@
             <a:fld id="{530820CF-B880-4189-942D-D702A7CBA730}" type="datetimeFigureOut">
               <a:rPr lang="zh-CN" altLang="en-US" smtClean="0"/>
               <a:pPr/>
-              <a:t>2015/9/11</a:t>
+              <a:t>2015/12/17</a:t>
             </a:fld>
             <a:endParaRPr lang="zh-CN" altLang="en-US"/>
           </a:p>
@@ -2010,7 +2011,7 @@
             <a:fld id="{530820CF-B880-4189-942D-D702A7CBA730}" type="datetimeFigureOut">
               <a:rPr lang="zh-CN" altLang="en-US" smtClean="0"/>
               <a:pPr/>
-              <a:t>2015/9/11</a:t>
+              <a:t>2015/12/17</a:t>
             </a:fld>
             <a:endParaRPr lang="zh-CN" altLang="en-US"/>
           </a:p>
@@ -2284,7 +2285,7 @@
             <a:fld id="{530820CF-B880-4189-942D-D702A7CBA730}" type="datetimeFigureOut">
               <a:rPr lang="zh-CN" altLang="en-US" smtClean="0"/>
               <a:pPr/>
-              <a:t>2015/9/11</a:t>
+              <a:t>2015/12/17</a:t>
             </a:fld>
             <a:endParaRPr lang="zh-CN" altLang="en-US"/>
           </a:p>
@@ -2534,7 +2535,7 @@
             <a:fld id="{530820CF-B880-4189-942D-D702A7CBA730}" type="datetimeFigureOut">
               <a:rPr lang="zh-CN" altLang="en-US" smtClean="0"/>
               <a:pPr/>
-              <a:t>2015/9/11</a:t>
+              <a:t>2015/12/17</a:t>
             </a:fld>
             <a:endParaRPr lang="zh-CN" altLang="en-US"/>
           </a:p>
@@ -2749,7 +2750,7 @@
             <a:fld id="{530820CF-B880-4189-942D-D702A7CBA730}" type="datetimeFigureOut">
               <a:rPr lang="zh-CN" altLang="en-US" smtClean="0"/>
               <a:pPr/>
-              <a:t>2015/9/11</a:t>
+              <a:t>2015/12/17</a:t>
             </a:fld>
             <a:endParaRPr lang="zh-CN" altLang="en-US"/>
           </a:p>
@@ -6102,15 +6103,7 @@
             </a:r>
             <a:r>
               <a:rPr lang="zh-CN" altLang="en-US" sz="1600" dirty="0" smtClean="0"/>
-              <a:t>、</a:t>
-            </a:r>
-            <a:r>
-              <a:rPr lang="zh-CN" altLang="en-US" sz="1600" dirty="0" smtClean="0"/>
-              <a:t>主题</a:t>
-            </a:r>
-            <a:r>
-              <a:rPr lang="zh-CN" altLang="en-US" sz="1600" dirty="0" smtClean="0"/>
-              <a:t>域</a:t>
+              <a:t>、主题域</a:t>
             </a:r>
             <a:r>
               <a:rPr lang="en-US" altLang="zh-CN" sz="1600" dirty="0" smtClean="0"/>
@@ -6142,11 +6135,7 @@
             </a:r>
             <a:r>
               <a:rPr lang="zh-CN" altLang="en-US" sz="1600" dirty="0" smtClean="0"/>
-              <a:t>、临时主题</a:t>
-            </a:r>
-            <a:r>
-              <a:rPr lang="zh-CN" altLang="en-US" sz="1600" dirty="0" smtClean="0"/>
-              <a:t>域</a:t>
+              <a:t>、临时主题域</a:t>
             </a:r>
             <a:r>
               <a:rPr lang="en-US" altLang="zh-CN" sz="1600" dirty="0" smtClean="0"/>
@@ -7353,11 +7342,7 @@
             </a:r>
             <a:r>
               <a:rPr lang="zh-CN" altLang="en-US" sz="1400" dirty="0" smtClean="0"/>
-              <a:t>发送消息</a:t>
-            </a:r>
-            <a:r>
-              <a:rPr lang="zh-CN" altLang="en-US" sz="1400" dirty="0" smtClean="0"/>
-              <a:t>给</a:t>
+              <a:t>发送消息给</a:t>
             </a:r>
             <a:r>
               <a:rPr lang="en-US" altLang="zh-CN" sz="1400" dirty="0" err="1" smtClean="0"/>
@@ -13537,6 +13522,193 @@
 </p:sld>
 </file>
 
+<file path=ppt/slides/slide42.xml><?xml version="1.0" encoding="utf-8"?>
+<p:sld xmlns:a="http://schemas.openxmlformats.org/drawingml/2006/main" xmlns:r="http://schemas.openxmlformats.org/officeDocument/2006/relationships" xmlns:p="http://schemas.openxmlformats.org/presentationml/2006/main">
+  <p:cSld>
+    <p:spTree>
+      <p:nvGrpSpPr>
+        <p:cNvPr id="1" name=""/>
+        <p:cNvGrpSpPr/>
+        <p:nvPr/>
+      </p:nvGrpSpPr>
+      <p:grpSpPr>
+        <a:xfrm>
+          <a:off x="0" y="0"/>
+          <a:ext cx="0" cy="0"/>
+          <a:chOff x="0" y="0"/>
+          <a:chExt cx="0" cy="0"/>
+        </a:xfrm>
+      </p:grpSpPr>
+      <p:pic>
+        <p:nvPicPr>
+          <p:cNvPr id="2" name="图片 1"/>
+          <p:cNvPicPr>
+            <a:picLocks noChangeAspect="1"/>
+          </p:cNvPicPr>
+          <p:nvPr/>
+        </p:nvPicPr>
+        <p:blipFill>
+          <a:blip r:embed="rId2"/>
+          <a:stretch>
+            <a:fillRect/>
+          </a:stretch>
+        </p:blipFill>
+        <p:spPr>
+          <a:xfrm>
+            <a:off x="179512" y="332656"/>
+            <a:ext cx="8817440" cy="4897817"/>
+          </a:xfrm>
+          <a:prstGeom prst="rect">
+            <a:avLst/>
+          </a:prstGeom>
+        </p:spPr>
+      </p:pic>
+      <p:sp>
+        <p:nvSpPr>
+          <p:cNvPr id="3" name="文本框 2"/>
+          <p:cNvSpPr txBox="1"/>
+          <p:nvPr/>
+        </p:nvSpPr>
+        <p:spPr>
+          <a:xfrm>
+            <a:off x="3491880" y="5373216"/>
+            <a:ext cx="1975221" cy="369332"/>
+          </a:xfrm>
+          <a:prstGeom prst="rect">
+            <a:avLst/>
+          </a:prstGeom>
+          <a:noFill/>
+        </p:spPr>
+        <p:txBody>
+          <a:bodyPr wrap="none" rtlCol="0">
+            <a:spAutoFit/>
+          </a:bodyPr>
+          <a:lstStyle/>
+          <a:p>
+            <a:r>
+              <a:rPr lang="en-US" altLang="zh-CN" dirty="0" smtClean="0"/>
+              <a:t>---</a:t>
+            </a:r>
+            <a:r>
+              <a:rPr lang="zh-CN" altLang="en-US" dirty="0" smtClean="0"/>
+              <a:t>携程实践架构</a:t>
+            </a:r>
+            <a:r>
+              <a:rPr lang="en-US" altLang="zh-CN" dirty="0" smtClean="0"/>
+              <a:t>---</a:t>
+            </a:r>
+            <a:endParaRPr lang="zh-CN" altLang="en-US" dirty="0"/>
+          </a:p>
+        </p:txBody>
+      </p:sp>
+      <p:sp>
+        <p:nvSpPr>
+          <p:cNvPr id="4" name="文本框 3"/>
+          <p:cNvSpPr txBox="1"/>
+          <p:nvPr/>
+        </p:nvSpPr>
+        <p:spPr>
+          <a:xfrm>
+            <a:off x="179512" y="5885291"/>
+            <a:ext cx="5735866" cy="923330"/>
+          </a:xfrm>
+          <a:prstGeom prst="rect">
+            <a:avLst/>
+          </a:prstGeom>
+          <a:noFill/>
+        </p:spPr>
+        <p:txBody>
+          <a:bodyPr wrap="none" rtlCol="0">
+            <a:spAutoFit/>
+          </a:bodyPr>
+          <a:lstStyle/>
+          <a:p>
+            <a:r>
+              <a:rPr lang="en-US" altLang="zh-CN" dirty="0" smtClean="0"/>
+              <a:t>1.MetaServer</a:t>
+            </a:r>
+            <a:r>
+              <a:rPr lang="zh-CN" altLang="en-US" dirty="0" smtClean="0"/>
+              <a:t>通过</a:t>
+            </a:r>
+            <a:r>
+              <a:rPr lang="en-US" altLang="zh-CN" dirty="0" smtClean="0"/>
+              <a:t>Lease</a:t>
+            </a:r>
+            <a:r>
+              <a:rPr lang="zh-CN" altLang="en-US" dirty="0" smtClean="0"/>
+              <a:t>发现</a:t>
+            </a:r>
+            <a:r>
+              <a:rPr lang="en-US" altLang="zh-CN" dirty="0" smtClean="0"/>
+              <a:t>Consumer</a:t>
+            </a:r>
+            <a:endParaRPr lang="en-US" altLang="zh-CN" dirty="0"/>
+          </a:p>
+          <a:p>
+            <a:r>
+              <a:rPr lang="en-US" altLang="zh-CN" dirty="0" smtClean="0"/>
+              <a:t>2.</a:t>
+            </a:r>
+            <a:r>
+              <a:rPr lang="zh-CN" altLang="en-US" dirty="0" smtClean="0"/>
+              <a:t>重新分配</a:t>
+            </a:r>
+            <a:r>
+              <a:rPr lang="en-US" altLang="zh-CN" dirty="0" smtClean="0"/>
+              <a:t>Topic. Partition</a:t>
+            </a:r>
+            <a:r>
+              <a:rPr lang="zh-CN" altLang="en-US" dirty="0" smtClean="0"/>
+              <a:t>到</a:t>
+            </a:r>
+            <a:r>
+              <a:rPr lang="en-US" altLang="zh-CN" dirty="0" smtClean="0"/>
+              <a:t>Consumer</a:t>
+            </a:r>
+          </a:p>
+          <a:p>
+            <a:r>
+              <a:rPr lang="en-US" altLang="zh-CN" dirty="0" smtClean="0"/>
+              <a:t>3.Consumer</a:t>
+            </a:r>
+            <a:r>
+              <a:rPr lang="zh-CN" altLang="en-US" dirty="0" smtClean="0"/>
+              <a:t>定期续租</a:t>
+            </a:r>
+            <a:r>
+              <a:rPr lang="en-US" altLang="zh-CN" dirty="0" smtClean="0"/>
+              <a:t>Lease</a:t>
+            </a:r>
+            <a:r>
+              <a:rPr lang="zh-CN" altLang="en-US" dirty="0" smtClean="0"/>
+              <a:t>，发生变更的</a:t>
+            </a:r>
+            <a:r>
+              <a:rPr lang="en-US" altLang="zh-CN" dirty="0" smtClean="0"/>
+              <a:t>lease</a:t>
+            </a:r>
+            <a:r>
+              <a:rPr lang="zh-CN" altLang="en-US" dirty="0" smtClean="0"/>
+              <a:t>不允许续租</a:t>
+            </a:r>
+            <a:endParaRPr lang="zh-CN" altLang="en-US" dirty="0"/>
+          </a:p>
+        </p:txBody>
+      </p:sp>
+    </p:spTree>
+    <p:extLst>
+      <p:ext uri="{BB962C8B-B14F-4D97-AF65-F5344CB8AC3E}">
+        <p14:creationId xmlns:p14="http://schemas.microsoft.com/office/powerpoint/2010/main" val="2832352880"/>
+      </p:ext>
+    </p:extLst>
+  </p:cSld>
+  <p:clrMapOvr>
+    <a:masterClrMapping/>
+  </p:clrMapOvr>
+</p:sld>
+</file>
+
 <file path=ppt/slides/slide5.xml><?xml version="1.0" encoding="utf-8"?>
 <p:sld xmlns:a="http://schemas.openxmlformats.org/drawingml/2006/main" xmlns:r="http://schemas.openxmlformats.org/officeDocument/2006/relationships" xmlns:p="http://schemas.openxmlformats.org/presentationml/2006/main">
   <p:cSld>
@@ -14887,7 +15059,7 @@
         <a:sysClr val="windowText" lastClr="000000"/>
       </a:dk1>
       <a:lt1>
-        <a:sysClr val="window" lastClr="FFFFFF"/>
+        <a:sysClr val="window" lastClr="CFE8CC"/>
       </a:lt1>
       <a:dk2>
         <a:srgbClr val="1F497D"/>

</xml_diff>